<commit_message>
update app, stock and slides
</commit_message>
<xml_diff>
--- a/Final_Project_Jupyter/5-min Slides.pptx
+++ b/Final_Project_Jupyter/5-min Slides.pptx
@@ -204,7 +204,7 @@
           <a:p>
             <a:fld id="{D734E050-08D4-4AF2-BD09-C5CA11F2AD65}" type="datetimeFigureOut">
               <a:rPr lang="en-US" smtClean="0"/>
-              <a:t>5/2/2018</a:t>
+              <a:t>5/3/2018</a:t>
             </a:fld>
             <a:endParaRPr lang="en-US"/>
           </a:p>
@@ -618,7 +618,7 @@
           <a:p>
             <a:fld id="{1EFAE40D-CC16-45DE-8F17-730BA2C5B91F}" type="datetime1">
               <a:rPr lang="en-US" smtClean="0"/>
-              <a:t>5/2/2018</a:t>
+              <a:t>5/3/2018</a:t>
             </a:fld>
             <a:endParaRPr lang="en-US"/>
           </a:p>
@@ -816,7 +816,7 @@
           <a:p>
             <a:fld id="{80373006-19C0-40AB-A8F6-49F18451B5AC}" type="datetime1">
               <a:rPr lang="en-US" smtClean="0"/>
-              <a:t>5/2/2018</a:t>
+              <a:t>5/3/2018</a:t>
             </a:fld>
             <a:endParaRPr lang="en-US"/>
           </a:p>
@@ -1024,7 +1024,7 @@
           <a:p>
             <a:fld id="{52266C67-5662-4E02-AE41-24D8FAFA458E}" type="datetime1">
               <a:rPr lang="en-US" smtClean="0"/>
-              <a:t>5/2/2018</a:t>
+              <a:t>5/3/2018</a:t>
             </a:fld>
             <a:endParaRPr lang="en-US"/>
           </a:p>
@@ -1222,7 +1222,7 @@
           <a:p>
             <a:fld id="{1C614BFF-D751-4D23-96B9-CACB83461C52}" type="datetime1">
               <a:rPr lang="en-US" smtClean="0"/>
-              <a:t>5/2/2018</a:t>
+              <a:t>5/3/2018</a:t>
             </a:fld>
             <a:endParaRPr lang="en-US"/>
           </a:p>
@@ -1497,7 +1497,7 @@
           <a:p>
             <a:fld id="{B60E25A5-F3A3-4F1F-B27F-92A1470B3A44}" type="datetime1">
               <a:rPr lang="en-US" smtClean="0"/>
-              <a:t>5/2/2018</a:t>
+              <a:t>5/3/2018</a:t>
             </a:fld>
             <a:endParaRPr lang="en-US"/>
           </a:p>
@@ -1762,7 +1762,7 @@
           <a:p>
             <a:fld id="{E3FFADCD-7120-4F7E-AEA8-4959CD8F1BF0}" type="datetime1">
               <a:rPr lang="en-US" smtClean="0"/>
-              <a:t>5/2/2018</a:t>
+              <a:t>5/3/2018</a:t>
             </a:fld>
             <a:endParaRPr lang="en-US"/>
           </a:p>
@@ -2174,7 +2174,7 @@
           <a:p>
             <a:fld id="{BE9B63F9-4F30-44D0-AF3C-51EA07B8C093}" type="datetime1">
               <a:rPr lang="en-US" smtClean="0"/>
-              <a:t>5/2/2018</a:t>
+              <a:t>5/3/2018</a:t>
             </a:fld>
             <a:endParaRPr lang="en-US"/>
           </a:p>
@@ -2315,7 +2315,7 @@
           <a:p>
             <a:fld id="{DA0D2D25-3726-495A-8A88-4C3622F5F750}" type="datetime1">
               <a:rPr lang="en-US" smtClean="0"/>
-              <a:t>5/2/2018</a:t>
+              <a:t>5/3/2018</a:t>
             </a:fld>
             <a:endParaRPr lang="en-US"/>
           </a:p>
@@ -2428,7 +2428,7 @@
           <a:p>
             <a:fld id="{395DFD89-45FA-4A60-A65C-D60266A5F1BE}" type="datetime1">
               <a:rPr lang="en-US" smtClean="0"/>
-              <a:t>5/2/2018</a:t>
+              <a:t>5/3/2018</a:t>
             </a:fld>
             <a:endParaRPr lang="en-US"/>
           </a:p>
@@ -2739,7 +2739,7 @@
           <a:p>
             <a:fld id="{E027E96B-94D8-4866-B0AD-6D9E2D6DC27F}" type="datetime1">
               <a:rPr lang="en-US" smtClean="0"/>
-              <a:t>5/2/2018</a:t>
+              <a:t>5/3/2018</a:t>
             </a:fld>
             <a:endParaRPr lang="en-US"/>
           </a:p>
@@ -3027,7 +3027,7 @@
           <a:p>
             <a:fld id="{CAEEC95D-0794-4682-A422-BA5589FBF5F9}" type="datetime1">
               <a:rPr lang="en-US" smtClean="0"/>
-              <a:t>5/2/2018</a:t>
+              <a:t>5/3/2018</a:t>
             </a:fld>
             <a:endParaRPr lang="en-US"/>
           </a:p>
@@ -3268,7 +3268,7 @@
           <a:p>
             <a:fld id="{5CA1761F-E11B-41FE-807E-C555EC0FF5B4}" type="datetime1">
               <a:rPr lang="en-US" smtClean="0"/>
-              <a:t>5/2/2018</a:t>
+              <a:t>5/3/2018</a:t>
             </a:fld>
             <a:endParaRPr lang="en-US"/>
           </a:p>
@@ -8835,7 +8835,7 @@
         <p:spPr>
           <a:xfrm>
             <a:off x="887361" y="1367136"/>
-            <a:ext cx="10266058" cy="4247317"/>
+            <a:ext cx="10266058" cy="4385816"/>
           </a:xfrm>
           <a:prstGeom prst="rect">
             <a:avLst/>
@@ -8856,12 +8856,9 @@
             </a:pPr>
             <a:r>
               <a:rPr lang="en-US" sz="2400" dirty="0"/>
-              <a:t>I was once unable to access google finance data for a few hours right after first data access. </a:t>
-            </a:r>
-            <a:r>
-              <a:rPr lang="en-US" dirty="0"/>
-              <a:t>Symptoms: requested 1576800 data entries [success] -&gt; requested again in like 15s [failed] -&gt; requested again [failed] -&gt; 24 hours later -&gt; requested 1000 data [success]</a:t>
-            </a:r>
+              <a:t>You may encounter a SSL bad handshake error. I have tried to address this in many different ways such as setting SSL verify to false, but Here is the best one: reboot your laptop/pc and run app.py again   </a:t>
+            </a:r>
+            <a:endParaRPr lang="en-US" dirty="0"/>
           </a:p>
           <a:p>
             <a:pPr lvl="1">
@@ -8929,6 +8926,45 @@
           </a:p>
         </p:txBody>
       </p:sp>
+      <p:pic>
+        <p:nvPicPr>
+          <p:cNvPr id="5" name="Graphic 4" descr="Winking Face with No Fill">
+            <a:extLst>
+              <a:ext uri="{FF2B5EF4-FFF2-40B4-BE49-F238E27FC236}">
+                <a16:creationId xmlns:a16="http://schemas.microsoft.com/office/drawing/2014/main" id="{430A65CC-359E-49F1-B0A5-543AE92FF8B2}"/>
+              </a:ext>
+            </a:extLst>
+          </p:cNvPr>
+          <p:cNvPicPr>
+            <a:picLocks noChangeAspect="1"/>
+          </p:cNvPicPr>
+          <p:nvPr/>
+        </p:nvPicPr>
+        <p:blipFill>
+          <a:blip r:embed="rId2">
+            <a:extLst>
+              <a:ext uri="{28A0092B-C50C-407E-A947-70E740481C1C}">
+                <a14:useLocalDpi xmlns:a14="http://schemas.microsoft.com/office/drawing/2010/main" val="0"/>
+              </a:ext>
+              <a:ext uri="{96DAC541-7B7A-43D3-8B79-37D633B846F1}">
+                <asvg:svgBlip xmlns:asvg="http://schemas.microsoft.com/office/drawing/2016/SVG/main" r:embed="rId3"/>
+              </a:ext>
+            </a:extLst>
+          </a:blip>
+          <a:stretch>
+            <a:fillRect/>
+          </a:stretch>
+        </p:blipFill>
+        <p:spPr>
+          <a:xfrm>
+            <a:off x="7533968" y="2603092"/>
+            <a:ext cx="442452" cy="442452"/>
+          </a:xfrm>
+          <a:prstGeom prst="rect">
+            <a:avLst/>
+          </a:prstGeom>
+        </p:spPr>
+      </p:pic>
     </p:spTree>
     <p:extLst>
       <p:ext uri="{BB962C8B-B14F-4D97-AF65-F5344CB8AC3E}">

</xml_diff>